<commit_message>
Add HCO logo to slides 1_2-2_2
</commit_message>
<xml_diff>
--- a/slides/Tag-1_2-Git_Light.pptx
+++ b/slides/Tag-1_2-Git_Light.pptx
@@ -3893,6 +3893,42 @@
           </a:p>
         </p:txBody>
       </p:sp>
+      <p:pic>
+        <p:nvPicPr>
+          <p:cNvPr id="2" name="Grafik 1">
+            <a:extLst>
+              <a:ext uri="{FF2B5EF4-FFF2-40B4-BE49-F238E27FC236}">
+                <a16:creationId xmlns:a16="http://schemas.microsoft.com/office/drawing/2014/main" id="{B9492334-3531-D057-93A1-E788A9F4EDC5}"/>
+              </a:ext>
+            </a:extLst>
+          </p:cNvPr>
+          <p:cNvPicPr>
+            <a:picLocks noChangeAspect="1"/>
+          </p:cNvPicPr>
+          <p:nvPr userDrawn="1"/>
+        </p:nvPicPr>
+        <p:blipFill>
+          <a:blip r:embed="rId5">
+            <a:extLst>
+              <a:ext uri="{28A0092B-C50C-407E-A947-70E740481C1C}">
+                <a14:useLocalDpi xmlns:a14="http://schemas.microsoft.com/office/drawing/2010/main" val="0"/>
+              </a:ext>
+            </a:extLst>
+          </a:blip>
+          <a:stretch>
+            <a:fillRect/>
+          </a:stretch>
+        </p:blipFill>
+        <p:spPr>
+          <a:xfrm>
+            <a:off x="3383868" y="4481736"/>
+            <a:ext cx="2376264" cy="2376264"/>
+          </a:xfrm>
+          <a:prstGeom prst="rect">
+            <a:avLst/>
+          </a:prstGeom>
+        </p:spPr>
+      </p:pic>
     </p:spTree>
   </p:cSld>
   <p:clrMap bg1="lt1" tx1="dk1" bg2="lt2" tx2="dk2" accent1="accent1" accent2="accent2" accent3="accent3" accent4="accent4" accent5="accent5" accent6="accent6" hlink="hlink" folHlink="folHlink"/>

</xml_diff>